<commit_message>
wednesday ppt commit 2 30.3
</commit_message>
<xml_diff>
--- a/University/wednesday_30_03/PPT wednesday.pptx
+++ b/University/wednesday_30_03/PPT wednesday.pptx
@@ -5,51 +5,52 @@
     <p:sldMasterId id="2147483674" r:id="rId1"/>
   </p:sldMasterIdLst>
   <p:notesMasterIdLst>
-    <p:notesMasterId r:id="rId13"/>
+    <p:notesMasterId r:id="rId14"/>
   </p:notesMasterIdLst>
   <p:sldIdLst>
     <p:sldId id="256" r:id="rId2"/>
-    <p:sldId id="257" r:id="rId3"/>
-    <p:sldId id="315" r:id="rId4"/>
-    <p:sldId id="316" r:id="rId5"/>
-    <p:sldId id="317" r:id="rId6"/>
-    <p:sldId id="259" r:id="rId7"/>
-    <p:sldId id="318" r:id="rId8"/>
-    <p:sldId id="319" r:id="rId9"/>
-    <p:sldId id="321" r:id="rId10"/>
-    <p:sldId id="322" r:id="rId11"/>
-    <p:sldId id="323" r:id="rId12"/>
+    <p:sldId id="324" r:id="rId3"/>
+    <p:sldId id="325" r:id="rId4"/>
+    <p:sldId id="315" r:id="rId5"/>
+    <p:sldId id="316" r:id="rId6"/>
+    <p:sldId id="317" r:id="rId7"/>
+    <p:sldId id="259" r:id="rId8"/>
+    <p:sldId id="318" r:id="rId9"/>
+    <p:sldId id="319" r:id="rId10"/>
+    <p:sldId id="321" r:id="rId11"/>
+    <p:sldId id="322" r:id="rId12"/>
+    <p:sldId id="323" r:id="rId13"/>
   </p:sldIdLst>
   <p:sldSz cx="9144000" cy="5143500" type="screen16x9"/>
   <p:notesSz cx="6858000" cy="9144000"/>
   <p:embeddedFontLst>
     <p:embeddedFont>
       <p:font typeface="Arimo" panose="020B0604020202020204" charset="0"/>
-      <p:regular r:id="rId14"/>
-      <p:bold r:id="rId15"/>
-      <p:italic r:id="rId16"/>
-      <p:boldItalic r:id="rId17"/>
+      <p:regular r:id="rId15"/>
+      <p:bold r:id="rId16"/>
+      <p:italic r:id="rId17"/>
+      <p:boldItalic r:id="rId18"/>
     </p:embeddedFont>
     <p:embeddedFont>
       <p:font typeface="Montserrat" panose="00000500000000000000" pitchFamily="2" charset="0"/>
-      <p:regular r:id="rId18"/>
-      <p:bold r:id="rId19"/>
-      <p:italic r:id="rId20"/>
-      <p:boldItalic r:id="rId21"/>
+      <p:regular r:id="rId19"/>
+      <p:bold r:id="rId20"/>
+      <p:italic r:id="rId21"/>
+      <p:boldItalic r:id="rId22"/>
     </p:embeddedFont>
     <p:embeddedFont>
       <p:font typeface="Roboto Condensed" panose="02000000000000000000" pitchFamily="2" charset="0"/>
-      <p:regular r:id="rId22"/>
-      <p:bold r:id="rId23"/>
-      <p:italic r:id="rId24"/>
-      <p:boldItalic r:id="rId25"/>
+      <p:regular r:id="rId23"/>
+      <p:bold r:id="rId24"/>
+      <p:italic r:id="rId25"/>
+      <p:boldItalic r:id="rId26"/>
     </p:embeddedFont>
     <p:embeddedFont>
       <p:font typeface="Share" panose="020B0604020202020204" charset="0"/>
-      <p:regular r:id="rId26"/>
-      <p:bold r:id="rId27"/>
-      <p:italic r:id="rId28"/>
-      <p:boldItalic r:id="rId29"/>
+      <p:regular r:id="rId27"/>
+      <p:bold r:id="rId28"/>
+      <p:italic r:id="rId29"/>
+      <p:boldItalic r:id="rId30"/>
     </p:embeddedFont>
   </p:embeddedFontLst>
   <p:defaultTextStyle>
@@ -944,6 +945,115 @@
     </p:spTree>
     <p:extLst>
       <p:ext uri="{BB962C8B-B14F-4D97-AF65-F5344CB8AC3E}">
+        <p14:creationId xmlns:p14="http://schemas.microsoft.com/office/powerpoint/2010/main" val="447735084"/>
+      </p:ext>
+    </p:extLst>
+  </p:cSld>
+  <p:clrMapOvr>
+    <a:masterClrMapping/>
+  </p:clrMapOvr>
+</p:notes>
+</file>
+
+<file path=ppt/notesSlides/notesSlide11.xml><?xml version="1.0" encoding="utf-8"?>
+<p:notes xmlns:a="http://schemas.openxmlformats.org/drawingml/2006/main" xmlns:r="http://schemas.openxmlformats.org/officeDocument/2006/relationships" xmlns:p="http://schemas.openxmlformats.org/presentationml/2006/main" showMasterSp="0" showMasterPhAnim="0">
+  <p:cSld>
+    <p:spTree>
+      <p:nvGrpSpPr>
+        <p:cNvPr id="1" name="Shape 614"/>
+        <p:cNvGrpSpPr/>
+        <p:nvPr/>
+      </p:nvGrpSpPr>
+      <p:grpSpPr>
+        <a:xfrm>
+          <a:off x="0" y="0"/>
+          <a:ext cx="0" cy="0"/>
+          <a:chOff x="0" y="0"/>
+          <a:chExt cx="0" cy="0"/>
+        </a:xfrm>
+      </p:grpSpPr>
+      <p:sp>
+        <p:nvSpPr>
+          <p:cNvPr id="615" name="Google Shape;615;g718d4d8f4a_1_40:notes"/>
+          <p:cNvSpPr>
+            <a:spLocks noGrp="1" noRot="1" noChangeAspect="1"/>
+          </p:cNvSpPr>
+          <p:nvPr>
+            <p:ph type="sldImg" idx="2"/>
+          </p:nvPr>
+        </p:nvSpPr>
+        <p:spPr>
+          <a:xfrm>
+            <a:off x="381000" y="685800"/>
+            <a:ext cx="6096000" cy="3429000"/>
+          </a:xfrm>
+          <a:custGeom>
+            <a:avLst/>
+            <a:gdLst/>
+            <a:ahLst/>
+            <a:cxnLst/>
+            <a:rect l="l" t="t" r="r" b="b"/>
+            <a:pathLst>
+              <a:path w="120000" h="120000" extrusionOk="0">
+                <a:moveTo>
+                  <a:pt x="0" y="0"/>
+                </a:moveTo>
+                <a:lnTo>
+                  <a:pt x="120000" y="0"/>
+                </a:lnTo>
+                <a:lnTo>
+                  <a:pt x="120000" y="120000"/>
+                </a:lnTo>
+                <a:lnTo>
+                  <a:pt x="0" y="120000"/>
+                </a:lnTo>
+                <a:close/>
+              </a:path>
+            </a:pathLst>
+          </a:custGeom>
+        </p:spPr>
+      </p:sp>
+      <p:sp>
+        <p:nvSpPr>
+          <p:cNvPr id="616" name="Google Shape;616;g718d4d8f4a_1_40:notes"/>
+          <p:cNvSpPr txBox="1">
+            <a:spLocks noGrp="1"/>
+          </p:cNvSpPr>
+          <p:nvPr>
+            <p:ph type="body" idx="1"/>
+          </p:nvPr>
+        </p:nvSpPr>
+        <p:spPr>
+          <a:xfrm>
+            <a:off x="685800" y="4343400"/>
+            <a:ext cx="5486400" cy="4114800"/>
+          </a:xfrm>
+          <a:prstGeom prst="rect">
+            <a:avLst/>
+          </a:prstGeom>
+        </p:spPr>
+        <p:txBody>
+          <a:bodyPr spcFirstLastPara="1" wrap="square" lIns="91425" tIns="91425" rIns="91425" bIns="91425" anchor="t" anchorCtr="0">
+            <a:noAutofit/>
+          </a:bodyPr>
+          <a:lstStyle/>
+          <a:p>
+            <a:pPr marL="0" lvl="0" indent="0" algn="l" rtl="0">
+              <a:spcBef>
+                <a:spcPts val="0"/>
+              </a:spcBef>
+              <a:spcAft>
+                <a:spcPts val="0"/>
+              </a:spcAft>
+              <a:buNone/>
+            </a:pPr>
+            <a:endParaRPr dirty="0"/>
+          </a:p>
+        </p:txBody>
+      </p:sp>
+    </p:spTree>
+    <p:extLst>
+      <p:ext uri="{BB962C8B-B14F-4D97-AF65-F5344CB8AC3E}">
         <p14:creationId xmlns:p14="http://schemas.microsoft.com/office/powerpoint/2010/main" val="318503915"/>
       </p:ext>
     </p:extLst>
@@ -954,7 +1064,7 @@
 </p:notes>
 </file>
 
-<file path=ppt/notesSlides/notesSlide11.xml><?xml version="1.0" encoding="utf-8"?>
+<file path=ppt/notesSlides/notesSlide12.xml><?xml version="1.0" encoding="utf-8"?>
 <p:notes xmlns:a="http://schemas.openxmlformats.org/drawingml/2006/main" xmlns:r="http://schemas.openxmlformats.org/officeDocument/2006/relationships" xmlns:p="http://schemas.openxmlformats.org/presentationml/2006/main" showMasterSp="0" showMasterPhAnim="0">
   <p:cSld>
     <p:spTree>
@@ -1160,6 +1270,11 @@
         </p:txBody>
       </p:sp>
     </p:spTree>
+    <p:extLst>
+      <p:ext uri="{BB962C8B-B14F-4D97-AF65-F5344CB8AC3E}">
+        <p14:creationId xmlns:p14="http://schemas.microsoft.com/office/powerpoint/2010/main" val="1061434557"/>
+      </p:ext>
+    </p:extLst>
   </p:cSld>
   <p:clrMapOvr>
     <a:masterClrMapping/>
@@ -1266,7 +1381,7 @@
     </p:spTree>
     <p:extLst>
       <p:ext uri="{BB962C8B-B14F-4D97-AF65-F5344CB8AC3E}">
-        <p14:creationId xmlns:p14="http://schemas.microsoft.com/office/powerpoint/2010/main" val="1867836069"/>
+        <p14:creationId xmlns:p14="http://schemas.microsoft.com/office/powerpoint/2010/main" val="3463161107"/>
       </p:ext>
     </p:extLst>
   </p:cSld>
@@ -1375,7 +1490,7 @@
     </p:spTree>
     <p:extLst>
       <p:ext uri="{BB962C8B-B14F-4D97-AF65-F5344CB8AC3E}">
-        <p14:creationId xmlns:p14="http://schemas.microsoft.com/office/powerpoint/2010/main" val="1257813661"/>
+        <p14:creationId xmlns:p14="http://schemas.microsoft.com/office/powerpoint/2010/main" val="1867836069"/>
       </p:ext>
     </p:extLst>
   </p:cSld>
@@ -1484,7 +1599,7 @@
     </p:spTree>
     <p:extLst>
       <p:ext uri="{BB962C8B-B14F-4D97-AF65-F5344CB8AC3E}">
-        <p14:creationId xmlns:p14="http://schemas.microsoft.com/office/powerpoint/2010/main" val="687183819"/>
+        <p14:creationId xmlns:p14="http://schemas.microsoft.com/office/powerpoint/2010/main" val="1257813661"/>
       </p:ext>
     </p:extLst>
   </p:cSld>
@@ -1499,7 +1614,7 @@
   <p:cSld>
     <p:spTree>
       <p:nvGrpSpPr>
-        <p:cNvPr id="1" name="Shape 614"/>
+        <p:cNvPr id="1" name="Shape 600"/>
         <p:cNvGrpSpPr/>
         <p:nvPr/>
       </p:nvGrpSpPr>
@@ -1513,7 +1628,7 @@
       </p:grpSpPr>
       <p:sp>
         <p:nvSpPr>
-          <p:cNvPr id="615" name="Google Shape;615;g718d4d8f4a_1_40:notes"/>
+          <p:cNvPr id="601" name="Google Shape;601;g70f1f795cd_0_5:notes"/>
           <p:cNvSpPr>
             <a:spLocks noGrp="1" noRot="1" noChangeAspect="1"/>
           </p:cNvSpPr>
@@ -1554,7 +1669,7 @@
       </p:sp>
       <p:sp>
         <p:nvSpPr>
-          <p:cNvPr id="616" name="Google Shape;616;g718d4d8f4a_1_40:notes"/>
+          <p:cNvPr id="602" name="Google Shape;602;g70f1f795cd_0_5:notes"/>
           <p:cNvSpPr txBox="1">
             <a:spLocks noGrp="1"/>
           </p:cNvSpPr>
@@ -1591,6 +1706,11 @@
         </p:txBody>
       </p:sp>
     </p:spTree>
+    <p:extLst>
+      <p:ext uri="{BB962C8B-B14F-4D97-AF65-F5344CB8AC3E}">
+        <p14:creationId xmlns:p14="http://schemas.microsoft.com/office/powerpoint/2010/main" val="687183819"/>
+      </p:ext>
+    </p:extLst>
   </p:cSld>
   <p:clrMapOvr>
     <a:masterClrMapping/>
@@ -1695,11 +1815,6 @@
         </p:txBody>
       </p:sp>
     </p:spTree>
-    <p:extLst>
-      <p:ext uri="{BB962C8B-B14F-4D97-AF65-F5344CB8AC3E}">
-        <p14:creationId xmlns:p14="http://schemas.microsoft.com/office/powerpoint/2010/main" val="3530920270"/>
-      </p:ext>
-    </p:extLst>
   </p:cSld>
   <p:clrMapOvr>
     <a:masterClrMapping/>
@@ -1806,7 +1921,7 @@
     </p:spTree>
     <p:extLst>
       <p:ext uri="{BB962C8B-B14F-4D97-AF65-F5344CB8AC3E}">
-        <p14:creationId xmlns:p14="http://schemas.microsoft.com/office/powerpoint/2010/main" val="659464998"/>
+        <p14:creationId xmlns:p14="http://schemas.microsoft.com/office/powerpoint/2010/main" val="3530920270"/>
       </p:ext>
     </p:extLst>
   </p:cSld>
@@ -1915,7 +2030,7 @@
     </p:spTree>
     <p:extLst>
       <p:ext uri="{BB962C8B-B14F-4D97-AF65-F5344CB8AC3E}">
-        <p14:creationId xmlns:p14="http://schemas.microsoft.com/office/powerpoint/2010/main" val="447735084"/>
+        <p14:creationId xmlns:p14="http://schemas.microsoft.com/office/powerpoint/2010/main" val="659464998"/>
       </p:ext>
     </p:extLst>
   </p:cSld>
@@ -25903,6 +26018,460 @@
             </a:pPr>
             <a:r>
               <a:rPr lang="de-DE" dirty="0"/>
+              <a:t>Time </a:t>
+            </a:r>
+            <a:r>
+              <a:rPr lang="de-DE" dirty="0" err="1"/>
+              <a:t>Expense</a:t>
+            </a:r>
+            <a:endParaRPr dirty="0"/>
+          </a:p>
+        </p:txBody>
+      </p:sp>
+      <p:sp>
+        <p:nvSpPr>
+          <p:cNvPr id="629" name="Google Shape;629;p32"/>
+          <p:cNvSpPr/>
+          <p:nvPr/>
+        </p:nvSpPr>
+        <p:spPr>
+          <a:xfrm>
+            <a:off x="-8301" y="-5994"/>
+            <a:ext cx="1118700" cy="565500"/>
+          </a:xfrm>
+          <a:prstGeom prst="diamond">
+            <a:avLst/>
+          </a:prstGeom>
+          <a:noFill/>
+          <a:ln w="28575" cap="flat" cmpd="sng">
+            <a:solidFill>
+              <a:schemeClr val="accent2"/>
+            </a:solidFill>
+            <a:prstDash val="solid"/>
+            <a:round/>
+            <a:headEnd type="none" w="sm" len="sm"/>
+            <a:tailEnd type="none" w="sm" len="sm"/>
+          </a:ln>
+        </p:spPr>
+        <p:txBody>
+          <a:bodyPr spcFirstLastPara="1" wrap="square" lIns="91425" tIns="91425" rIns="91425" bIns="91425" anchor="ctr" anchorCtr="0">
+            <a:noAutofit/>
+          </a:bodyPr>
+          <a:lstStyle/>
+          <a:p>
+            <a:pPr marL="0" lvl="0" indent="0" algn="l" rtl="0">
+              <a:spcBef>
+                <a:spcPts val="0"/>
+              </a:spcBef>
+              <a:spcAft>
+                <a:spcPts val="0"/>
+              </a:spcAft>
+              <a:buNone/>
+            </a:pPr>
+            <a:endParaRPr dirty="0"/>
+          </a:p>
+        </p:txBody>
+      </p:sp>
+      <p:sp>
+        <p:nvSpPr>
+          <p:cNvPr id="630" name="Google Shape;630;p32"/>
+          <p:cNvSpPr/>
+          <p:nvPr/>
+        </p:nvSpPr>
+        <p:spPr>
+          <a:xfrm>
+            <a:off x="559349" y="-288744"/>
+            <a:ext cx="1118700" cy="565500"/>
+          </a:xfrm>
+          <a:prstGeom prst="diamond">
+            <a:avLst/>
+          </a:prstGeom>
+          <a:solidFill>
+            <a:schemeClr val="accent3"/>
+          </a:solidFill>
+          <a:ln>
+            <a:noFill/>
+          </a:ln>
+        </p:spPr>
+        <p:txBody>
+          <a:bodyPr spcFirstLastPara="1" wrap="square" lIns="91425" tIns="91425" rIns="91425" bIns="91425" anchor="ctr" anchorCtr="0">
+            <a:noAutofit/>
+          </a:bodyPr>
+          <a:lstStyle/>
+          <a:p>
+            <a:pPr marL="0" lvl="0" indent="0" algn="l" rtl="0">
+              <a:spcBef>
+                <a:spcPts val="0"/>
+              </a:spcBef>
+              <a:spcAft>
+                <a:spcPts val="0"/>
+              </a:spcAft>
+              <a:buNone/>
+            </a:pPr>
+            <a:endParaRPr dirty="0"/>
+          </a:p>
+        </p:txBody>
+      </p:sp>
+      <p:sp>
+        <p:nvSpPr>
+          <p:cNvPr id="631" name="Google Shape;631;p32"/>
+          <p:cNvSpPr/>
+          <p:nvPr/>
+        </p:nvSpPr>
+        <p:spPr>
+          <a:xfrm rot="5400000">
+            <a:off x="7622925" y="-188962"/>
+            <a:ext cx="1982400" cy="1106700"/>
+          </a:xfrm>
+          <a:prstGeom prst="hexagon">
+            <a:avLst>
+              <a:gd name="adj" fmla="val 25000"/>
+              <a:gd name="vf" fmla="val 115470"/>
+            </a:avLst>
+          </a:prstGeom>
+          <a:noFill/>
+          <a:ln w="28575" cap="flat" cmpd="sng">
+            <a:solidFill>
+              <a:schemeClr val="accent2"/>
+            </a:solidFill>
+            <a:prstDash val="solid"/>
+            <a:round/>
+            <a:headEnd type="none" w="sm" len="sm"/>
+            <a:tailEnd type="none" w="sm" len="sm"/>
+          </a:ln>
+        </p:spPr>
+        <p:txBody>
+          <a:bodyPr spcFirstLastPara="1" wrap="square" lIns="91425" tIns="91425" rIns="91425" bIns="91425" anchor="ctr" anchorCtr="0">
+            <a:noAutofit/>
+          </a:bodyPr>
+          <a:lstStyle/>
+          <a:p>
+            <a:pPr marL="0" lvl="0" indent="0" algn="l" rtl="0">
+              <a:spcBef>
+                <a:spcPts val="0"/>
+              </a:spcBef>
+              <a:spcAft>
+                <a:spcPts val="0"/>
+              </a:spcAft>
+              <a:buNone/>
+            </a:pPr>
+            <a:endParaRPr dirty="0"/>
+          </a:p>
+        </p:txBody>
+      </p:sp>
+      <p:sp>
+        <p:nvSpPr>
+          <p:cNvPr id="633" name="Google Shape;633;p32"/>
+          <p:cNvSpPr/>
+          <p:nvPr/>
+        </p:nvSpPr>
+        <p:spPr>
+          <a:xfrm>
+            <a:off x="8054775" y="1404426"/>
+            <a:ext cx="1118700" cy="565500"/>
+          </a:xfrm>
+          <a:prstGeom prst="diamond">
+            <a:avLst/>
+          </a:prstGeom>
+          <a:noFill/>
+          <a:ln w="28575" cap="flat" cmpd="sng">
+            <a:solidFill>
+              <a:schemeClr val="accent3"/>
+            </a:solidFill>
+            <a:prstDash val="solid"/>
+            <a:round/>
+            <a:headEnd type="none" w="sm" len="sm"/>
+            <a:tailEnd type="none" w="sm" len="sm"/>
+          </a:ln>
+        </p:spPr>
+        <p:txBody>
+          <a:bodyPr spcFirstLastPara="1" wrap="square" lIns="91425" tIns="91425" rIns="91425" bIns="91425" anchor="ctr" anchorCtr="0">
+            <a:noAutofit/>
+          </a:bodyPr>
+          <a:lstStyle/>
+          <a:p>
+            <a:pPr marL="0" lvl="0" indent="0" algn="l" rtl="0">
+              <a:spcBef>
+                <a:spcPts val="0"/>
+              </a:spcBef>
+              <a:spcAft>
+                <a:spcPts val="0"/>
+              </a:spcAft>
+              <a:buNone/>
+            </a:pPr>
+            <a:endParaRPr dirty="0"/>
+          </a:p>
+        </p:txBody>
+      </p:sp>
+      <p:pic>
+        <p:nvPicPr>
+          <p:cNvPr id="7" name="Grafik 6" descr="Münzen Silhouette">
+            <a:extLst>
+              <a:ext uri="{FF2B5EF4-FFF2-40B4-BE49-F238E27FC236}">
+                <a16:creationId xmlns:a16="http://schemas.microsoft.com/office/drawing/2014/main" id="{E356291B-8A1F-428F-8275-D658AC6F5FAC}"/>
+              </a:ext>
+            </a:extLst>
+          </p:cNvPr>
+          <p:cNvPicPr>
+            <a:picLocks noChangeAspect="1"/>
+          </p:cNvPicPr>
+          <p:nvPr/>
+        </p:nvPicPr>
+        <p:blipFill>
+          <a:blip r:embed="rId3">
+            <a:extLst>
+              <a:ext uri="{96DAC541-7B7A-43D3-8B79-37D633B846F1}">
+                <asvg:svgBlip xmlns:asvg="http://schemas.microsoft.com/office/drawing/2016/SVG/main" r:embed="rId4"/>
+              </a:ext>
+            </a:extLst>
+          </a:blip>
+          <a:stretch>
+            <a:fillRect/>
+          </a:stretch>
+        </p:blipFill>
+        <p:spPr>
+          <a:xfrm>
+            <a:off x="6448336" y="835455"/>
+            <a:ext cx="914400" cy="914400"/>
+          </a:xfrm>
+          <a:prstGeom prst="rect">
+            <a:avLst/>
+          </a:prstGeom>
+        </p:spPr>
+      </p:pic>
+      <p:pic>
+        <p:nvPicPr>
+          <p:cNvPr id="3" name="Grafik 2">
+            <a:extLst>
+              <a:ext uri="{FF2B5EF4-FFF2-40B4-BE49-F238E27FC236}">
+                <a16:creationId xmlns:a16="http://schemas.microsoft.com/office/drawing/2014/main" id="{9CAFBD88-1856-4D30-B130-E00C4304B66A}"/>
+              </a:ext>
+            </a:extLst>
+          </p:cNvPr>
+          <p:cNvPicPr>
+            <a:picLocks noChangeAspect="1"/>
+          </p:cNvPicPr>
+          <p:nvPr/>
+        </p:nvPicPr>
+        <p:blipFill rotWithShape="1">
+          <a:blip r:embed="rId5"/>
+          <a:srcRect l="26102" t="40979" r="27204" b="26629"/>
+          <a:stretch/>
+        </p:blipFill>
+        <p:spPr>
+          <a:xfrm>
+            <a:off x="1191937" y="1687176"/>
+            <a:ext cx="6203104" cy="2420450"/>
+          </a:xfrm>
+          <a:prstGeom prst="rect">
+            <a:avLst/>
+          </a:prstGeom>
+          <a:ln>
+            <a:noFill/>
+          </a:ln>
+          <a:effectLst>
+            <a:outerShdw blurRad="292100" dist="139700" dir="2700000" algn="tl" rotWithShape="0">
+              <a:srgbClr val="333333">
+                <a:alpha val="65000"/>
+              </a:srgbClr>
+            </a:outerShdw>
+          </a:effectLst>
+        </p:spPr>
+      </p:pic>
+      <p:pic>
+        <p:nvPicPr>
+          <p:cNvPr id="12" name="Grafik 11">
+            <a:extLst>
+              <a:ext uri="{FF2B5EF4-FFF2-40B4-BE49-F238E27FC236}">
+                <a16:creationId xmlns:a16="http://schemas.microsoft.com/office/drawing/2014/main" id="{22914723-15EE-4D3F-8A71-45C101724AF9}"/>
+              </a:ext>
+            </a:extLst>
+          </p:cNvPr>
+          <p:cNvPicPr>
+            <a:picLocks noChangeAspect="1"/>
+          </p:cNvPicPr>
+          <p:nvPr/>
+        </p:nvPicPr>
+        <p:blipFill rotWithShape="1">
+          <a:blip r:embed="rId6"/>
+          <a:srcRect l="26017" t="59058" r="27118" b="36874"/>
+          <a:stretch/>
+        </p:blipFill>
+        <p:spPr>
+          <a:xfrm>
+            <a:off x="779868" y="4616245"/>
+            <a:ext cx="7027241" cy="343102"/>
+          </a:xfrm>
+          <a:prstGeom prst="rect">
+            <a:avLst/>
+          </a:prstGeom>
+          <a:ln>
+            <a:noFill/>
+          </a:ln>
+          <a:effectLst>
+            <a:outerShdw blurRad="292100" dist="139700" dir="2700000" algn="tl" rotWithShape="0">
+              <a:srgbClr val="333333">
+                <a:alpha val="65000"/>
+              </a:srgbClr>
+            </a:outerShdw>
+          </a:effectLst>
+        </p:spPr>
+      </p:pic>
+      <p:sp>
+        <p:nvSpPr>
+          <p:cNvPr id="4" name="Pfeil: nach unten 3">
+            <a:extLst>
+              <a:ext uri="{FF2B5EF4-FFF2-40B4-BE49-F238E27FC236}">
+                <a16:creationId xmlns:a16="http://schemas.microsoft.com/office/drawing/2014/main" id="{D55FB2AA-AD06-4D88-9D9B-6C7223B15C1C}"/>
+              </a:ext>
+            </a:extLst>
+          </p:cNvPr>
+          <p:cNvSpPr/>
+          <p:nvPr/>
+        </p:nvSpPr>
+        <p:spPr>
+          <a:xfrm>
+            <a:off x="3785918" y="4152996"/>
+            <a:ext cx="1015139" cy="417879"/>
+          </a:xfrm>
+          <a:prstGeom prst="downArrow">
+            <a:avLst/>
+          </a:prstGeom>
+          <a:ln>
+            <a:noFill/>
+          </a:ln>
+        </p:spPr>
+        <p:style>
+          <a:lnRef idx="2">
+            <a:schemeClr val="accent1">
+              <a:shade val="50000"/>
+            </a:schemeClr>
+          </a:lnRef>
+          <a:fillRef idx="1">
+            <a:schemeClr val="accent1"/>
+          </a:fillRef>
+          <a:effectRef idx="0">
+            <a:schemeClr val="accent1"/>
+          </a:effectRef>
+          <a:fontRef idx="minor">
+            <a:schemeClr val="lt1"/>
+          </a:fontRef>
+        </p:style>
+        <p:txBody>
+          <a:bodyPr rtlCol="0" anchor="ctr"/>
+          <a:lstStyle/>
+          <a:p>
+            <a:pPr algn="ctr"/>
+            <a:endParaRPr lang="de-DE"/>
+          </a:p>
+        </p:txBody>
+      </p:sp>
+    </p:spTree>
+    <p:extLst>
+      <p:ext uri="{BB962C8B-B14F-4D97-AF65-F5344CB8AC3E}">
+        <p14:creationId xmlns:p14="http://schemas.microsoft.com/office/powerpoint/2010/main" val="2924829807"/>
+      </p:ext>
+    </p:extLst>
+  </p:cSld>
+  <p:clrMapOvr>
+    <a:masterClrMapping/>
+  </p:clrMapOvr>
+</p:sld>
+</file>
+
+<file path=ppt/slides/slide11.xml><?xml version="1.0" encoding="utf-8"?>
+<p:sld xmlns:a="http://schemas.openxmlformats.org/drawingml/2006/main" xmlns:r="http://schemas.openxmlformats.org/officeDocument/2006/relationships" xmlns:p="http://schemas.openxmlformats.org/presentationml/2006/main">
+  <p:cSld>
+    <p:spTree>
+      <p:nvGrpSpPr>
+        <p:cNvPr id="1" name="Shape 617"/>
+        <p:cNvGrpSpPr/>
+        <p:nvPr/>
+      </p:nvGrpSpPr>
+      <p:grpSpPr>
+        <a:xfrm>
+          <a:off x="0" y="0"/>
+          <a:ext cx="0" cy="0"/>
+          <a:chOff x="0" y="0"/>
+          <a:chExt cx="0" cy="0"/>
+        </a:xfrm>
+      </p:grpSpPr>
+      <p:sp>
+        <p:nvSpPr>
+          <p:cNvPr id="618" name="Google Shape;618;p32"/>
+          <p:cNvSpPr/>
+          <p:nvPr/>
+        </p:nvSpPr>
+        <p:spPr>
+          <a:xfrm>
+            <a:off x="8054775" y="790114"/>
+            <a:ext cx="1118700" cy="565500"/>
+          </a:xfrm>
+          <a:prstGeom prst="diamond">
+            <a:avLst/>
+          </a:prstGeom>
+          <a:solidFill>
+            <a:schemeClr val="accent1"/>
+          </a:solidFill>
+          <a:ln>
+            <a:noFill/>
+          </a:ln>
+        </p:spPr>
+        <p:txBody>
+          <a:bodyPr spcFirstLastPara="1" wrap="square" lIns="91425" tIns="91425" rIns="91425" bIns="91425" anchor="ctr" anchorCtr="0">
+            <a:noAutofit/>
+          </a:bodyPr>
+          <a:lstStyle/>
+          <a:p>
+            <a:pPr marL="0" lvl="0" indent="0" algn="l" rtl="0">
+              <a:spcBef>
+                <a:spcPts val="0"/>
+              </a:spcBef>
+              <a:spcAft>
+                <a:spcPts val="0"/>
+              </a:spcAft>
+              <a:buNone/>
+            </a:pPr>
+            <a:endParaRPr dirty="0"/>
+          </a:p>
+        </p:txBody>
+      </p:sp>
+      <p:sp>
+        <p:nvSpPr>
+          <p:cNvPr id="619" name="Google Shape;619;p32"/>
+          <p:cNvSpPr txBox="1">
+            <a:spLocks noGrp="1"/>
+          </p:cNvSpPr>
+          <p:nvPr>
+            <p:ph type="title" idx="15"/>
+          </p:nvPr>
+        </p:nvSpPr>
+        <p:spPr>
+          <a:xfrm>
+            <a:off x="337389" y="228855"/>
+            <a:ext cx="7912200" cy="606600"/>
+          </a:xfrm>
+          <a:prstGeom prst="rect">
+            <a:avLst/>
+          </a:prstGeom>
+        </p:spPr>
+        <p:txBody>
+          <a:bodyPr spcFirstLastPara="1" wrap="square" lIns="91425" tIns="91425" rIns="91425" bIns="91425" anchor="b" anchorCtr="0">
+            <a:noAutofit/>
+          </a:bodyPr>
+          <a:lstStyle/>
+          <a:p>
+            <a:pPr marL="0" lvl="0" indent="0" algn="ctr" rtl="0">
+              <a:spcBef>
+                <a:spcPts val="0"/>
+              </a:spcBef>
+              <a:spcAft>
+                <a:spcPts val="0"/>
+              </a:spcAft>
+              <a:buNone/>
+            </a:pPr>
+            <a:r>
+              <a:rPr lang="de-DE" dirty="0"/>
               <a:t>Profit </a:t>
             </a:r>
             <a:r>
@@ -26212,7 +26781,7 @@
 </p:sld>
 </file>
 
-<file path=ppt/slides/slide11.xml><?xml version="1.0" encoding="utf-8"?>
+<file path=ppt/slides/slide12.xml><?xml version="1.0" encoding="utf-8"?>
 <p:sld xmlns:a="http://schemas.openxmlformats.org/drawingml/2006/main" xmlns:r="http://schemas.openxmlformats.org/officeDocument/2006/relationships" xmlns:p="http://schemas.openxmlformats.org/presentationml/2006/main">
   <p:cSld>
     <p:spTree>
@@ -27801,6 +28370,99 @@
           <a:chExt cx="0" cy="0"/>
         </a:xfrm>
       </p:grpSpPr>
+      <p:graphicFrame>
+        <p:nvGraphicFramePr>
+          <p:cNvPr id="2" name="Objekt 1">
+            <a:extLst>
+              <a:ext uri="{FF2B5EF4-FFF2-40B4-BE49-F238E27FC236}">
+                <a16:creationId xmlns:a16="http://schemas.microsoft.com/office/drawing/2014/main" id="{A090E149-FEBE-4C18-8920-16F4C2ACEE64}"/>
+              </a:ext>
+            </a:extLst>
+          </p:cNvPr>
+          <p:cNvGraphicFramePr>
+            <a:graphicFrameLocks noChangeAspect="1"/>
+          </p:cNvGraphicFramePr>
+          <p:nvPr>
+            <p:extLst>
+              <p:ext uri="{D42A27DB-BD31-4B8C-83A1-F6EECF244321}">
+                <p14:modId xmlns:p14="http://schemas.microsoft.com/office/powerpoint/2010/main" val="1661819869"/>
+              </p:ext>
+            </p:extLst>
+          </p:nvPr>
+        </p:nvGraphicFramePr>
+        <p:xfrm>
+          <a:off x="2099026" y="1"/>
+          <a:ext cx="4332772" cy="5246876"/>
+        </p:xfrm>
+        <a:graphic>
+          <a:graphicData uri="http://schemas.openxmlformats.org/presentationml/2006/ole">
+            <mc:AlternateContent xmlns:mc="http://schemas.openxmlformats.org/markup-compatibility/2006">
+              <mc:Choice xmlns:v="urn:schemas-microsoft-com:vml" Requires="v">
+                <p:oleObj spid="_x0000_s1027" name="Acrobat Document" r:id="rId4" imgW="5295826" imgH="6415758" progId="AcroExch.Document.DC">
+                  <p:embed/>
+                </p:oleObj>
+              </mc:Choice>
+              <mc:Fallback>
+                <p:oleObj name="Acrobat Document" r:id="rId4" imgW="5295826" imgH="6415758" progId="AcroExch.Document.DC">
+                  <p:embed/>
+                  <p:pic>
+                    <p:nvPicPr>
+                      <p:cNvPr id="0" name=""/>
+                      <p:cNvPicPr/>
+                      <p:nvPr/>
+                    </p:nvPicPr>
+                    <p:blipFill>
+                      <a:blip r:embed="rId5"/>
+                      <a:stretch>
+                        <a:fillRect/>
+                      </a:stretch>
+                    </p:blipFill>
+                    <p:spPr>
+                      <a:xfrm>
+                        <a:off x="2099026" y="1"/>
+                        <a:ext cx="4332772" cy="5246876"/>
+                      </a:xfrm>
+                      <a:prstGeom prst="rect">
+                        <a:avLst/>
+                      </a:prstGeom>
+                    </p:spPr>
+                  </p:pic>
+                </p:oleObj>
+              </mc:Fallback>
+            </mc:AlternateContent>
+          </a:graphicData>
+        </a:graphic>
+      </p:graphicFrame>
+    </p:spTree>
+    <p:extLst>
+      <p:ext uri="{BB962C8B-B14F-4D97-AF65-F5344CB8AC3E}">
+        <p14:creationId xmlns:p14="http://schemas.microsoft.com/office/powerpoint/2010/main" val="1959075810"/>
+      </p:ext>
+    </p:extLst>
+  </p:cSld>
+  <p:clrMapOvr>
+    <a:masterClrMapping/>
+  </p:clrMapOvr>
+</p:sld>
+</file>
+
+<file path=ppt/slides/slide3.xml><?xml version="1.0" encoding="utf-8"?>
+<p:sld xmlns:a="http://schemas.openxmlformats.org/drawingml/2006/main" xmlns:r="http://schemas.openxmlformats.org/officeDocument/2006/relationships" xmlns:p="http://schemas.openxmlformats.org/presentationml/2006/main">
+  <p:cSld>
+    <p:spTree>
+      <p:nvGrpSpPr>
+        <p:cNvPr id="1" name="Shape 603"/>
+        <p:cNvGrpSpPr/>
+        <p:nvPr/>
+      </p:nvGrpSpPr>
+      <p:grpSpPr>
+        <a:xfrm>
+          <a:off x="0" y="0"/>
+          <a:ext cx="0" cy="0"/>
+          <a:chOff x="0" y="0"/>
+          <a:chExt cx="0" cy="0"/>
+        </a:xfrm>
+      </p:grpSpPr>
       <p:pic>
         <p:nvPicPr>
           <p:cNvPr id="8" name="Grafik 7">
@@ -28202,6 +28864,11 @@
         </p:txBody>
       </p:sp>
     </p:spTree>
+    <p:extLst>
+      <p:ext uri="{BB962C8B-B14F-4D97-AF65-F5344CB8AC3E}">
+        <p14:creationId xmlns:p14="http://schemas.microsoft.com/office/powerpoint/2010/main" val="3826283265"/>
+      </p:ext>
+    </p:extLst>
   </p:cSld>
   <p:clrMapOvr>
     <a:masterClrMapping/>
@@ -28209,7 +28876,7 @@
 </p:sld>
 </file>
 
-<file path=ppt/slides/slide3.xml><?xml version="1.0" encoding="utf-8"?>
+<file path=ppt/slides/slide4.xml><?xml version="1.0" encoding="utf-8"?>
 <p:sld xmlns:a="http://schemas.openxmlformats.org/drawingml/2006/main" xmlns:r="http://schemas.openxmlformats.org/officeDocument/2006/relationships" xmlns:p="http://schemas.openxmlformats.org/presentationml/2006/main">
   <p:cSld>
     <p:spTree>
@@ -28436,7 +29103,7 @@
 </p:sld>
 </file>
 
-<file path=ppt/slides/slide4.xml><?xml version="1.0" encoding="utf-8"?>
+<file path=ppt/slides/slide5.xml><?xml version="1.0" encoding="utf-8"?>
 <p:sld xmlns:a="http://schemas.openxmlformats.org/drawingml/2006/main" xmlns:r="http://schemas.openxmlformats.org/officeDocument/2006/relationships" xmlns:p="http://schemas.openxmlformats.org/presentationml/2006/main">
   <p:cSld>
     <p:spTree>
@@ -28474,8 +29141,8 @@
         </p:blipFill>
         <p:spPr>
           <a:xfrm>
-            <a:off x="-61982" y="443788"/>
-            <a:ext cx="9205982" cy="1242551"/>
+            <a:off x="-61982" y="443789"/>
+            <a:ext cx="9205982" cy="1020802"/>
           </a:xfrm>
           <a:prstGeom prst="rect">
             <a:avLst/>
@@ -28527,8 +29194,8 @@
         </p:nvCxnSpPr>
         <p:spPr>
           <a:xfrm>
-            <a:off x="0" y="1686339"/>
-            <a:ext cx="871779" cy="460176"/>
+            <a:off x="0" y="1464591"/>
+            <a:ext cx="871779" cy="681924"/>
           </a:xfrm>
           <a:prstGeom prst="line">
             <a:avLst/>
@@ -28570,8 +29237,8 @@
         </p:nvCxnSpPr>
         <p:spPr>
           <a:xfrm flipH="1" flipV="1">
-            <a:off x="5850610" y="1686339"/>
-            <a:ext cx="2421610" cy="460176"/>
+            <a:off x="5835112" y="1464591"/>
+            <a:ext cx="2437108" cy="681924"/>
           </a:xfrm>
           <a:prstGeom prst="line">
             <a:avLst/>
@@ -28691,7 +29358,7 @@
 </p:sld>
 </file>
 
-<file path=ppt/slides/slide5.xml><?xml version="1.0" encoding="utf-8"?>
+<file path=ppt/slides/slide6.xml><?xml version="1.0" encoding="utf-8"?>
 <p:sld xmlns:a="http://schemas.openxmlformats.org/drawingml/2006/main" xmlns:r="http://schemas.openxmlformats.org/officeDocument/2006/relationships" xmlns:p="http://schemas.openxmlformats.org/presentationml/2006/main">
   <p:cSld>
     <p:spTree>
@@ -28946,7 +29613,7 @@
 </p:sld>
 </file>
 
-<file path=ppt/slides/slide6.xml><?xml version="1.0" encoding="utf-8"?>
+<file path=ppt/slides/slide7.xml><?xml version="1.0" encoding="utf-8"?>
 <p:sld xmlns:a="http://schemas.openxmlformats.org/drawingml/2006/main" xmlns:r="http://schemas.openxmlformats.org/officeDocument/2006/relationships" xmlns:p="http://schemas.openxmlformats.org/presentationml/2006/main">
   <p:cSld>
     <p:spTree>
@@ -30941,7 +31608,7 @@
 </p:sld>
 </file>
 
-<file path=ppt/slides/slide7.xml><?xml version="1.0" encoding="utf-8"?>
+<file path=ppt/slides/slide8.xml><?xml version="1.0" encoding="utf-8"?>
 <p:sld xmlns:a="http://schemas.openxmlformats.org/drawingml/2006/main" xmlns:r="http://schemas.openxmlformats.org/officeDocument/2006/relationships" xmlns:p="http://schemas.openxmlformats.org/presentationml/2006/main">
   <p:cSld>
     <p:spTree>
@@ -32679,7 +33346,7 @@
 </p:sld>
 </file>
 
-<file path=ppt/slides/slide8.xml><?xml version="1.0" encoding="utf-8"?>
+<file path=ppt/slides/slide9.xml><?xml version="1.0" encoding="utf-8"?>
 <p:sld xmlns:a="http://schemas.openxmlformats.org/drawingml/2006/main" xmlns:r="http://schemas.openxmlformats.org/officeDocument/2006/relationships" xmlns:p="http://schemas.openxmlformats.org/presentationml/2006/main">
   <p:cSld>
     <p:spTree>
@@ -33036,460 +33703,6 @@
     <p:extLst>
       <p:ext uri="{BB962C8B-B14F-4D97-AF65-F5344CB8AC3E}">
         <p14:creationId xmlns:p14="http://schemas.microsoft.com/office/powerpoint/2010/main" val="1106606880"/>
-      </p:ext>
-    </p:extLst>
-  </p:cSld>
-  <p:clrMapOvr>
-    <a:masterClrMapping/>
-  </p:clrMapOvr>
-</p:sld>
-</file>
-
-<file path=ppt/slides/slide9.xml><?xml version="1.0" encoding="utf-8"?>
-<p:sld xmlns:a="http://schemas.openxmlformats.org/drawingml/2006/main" xmlns:r="http://schemas.openxmlformats.org/officeDocument/2006/relationships" xmlns:p="http://schemas.openxmlformats.org/presentationml/2006/main">
-  <p:cSld>
-    <p:spTree>
-      <p:nvGrpSpPr>
-        <p:cNvPr id="1" name="Shape 617"/>
-        <p:cNvGrpSpPr/>
-        <p:nvPr/>
-      </p:nvGrpSpPr>
-      <p:grpSpPr>
-        <a:xfrm>
-          <a:off x="0" y="0"/>
-          <a:ext cx="0" cy="0"/>
-          <a:chOff x="0" y="0"/>
-          <a:chExt cx="0" cy="0"/>
-        </a:xfrm>
-      </p:grpSpPr>
-      <p:sp>
-        <p:nvSpPr>
-          <p:cNvPr id="618" name="Google Shape;618;p32"/>
-          <p:cNvSpPr/>
-          <p:nvPr/>
-        </p:nvSpPr>
-        <p:spPr>
-          <a:xfrm>
-            <a:off x="8054775" y="790114"/>
-            <a:ext cx="1118700" cy="565500"/>
-          </a:xfrm>
-          <a:prstGeom prst="diamond">
-            <a:avLst/>
-          </a:prstGeom>
-          <a:solidFill>
-            <a:schemeClr val="accent1"/>
-          </a:solidFill>
-          <a:ln>
-            <a:noFill/>
-          </a:ln>
-        </p:spPr>
-        <p:txBody>
-          <a:bodyPr spcFirstLastPara="1" wrap="square" lIns="91425" tIns="91425" rIns="91425" bIns="91425" anchor="ctr" anchorCtr="0">
-            <a:noAutofit/>
-          </a:bodyPr>
-          <a:lstStyle/>
-          <a:p>
-            <a:pPr marL="0" lvl="0" indent="0" algn="l" rtl="0">
-              <a:spcBef>
-                <a:spcPts val="0"/>
-              </a:spcBef>
-              <a:spcAft>
-                <a:spcPts val="0"/>
-              </a:spcAft>
-              <a:buNone/>
-            </a:pPr>
-            <a:endParaRPr dirty="0"/>
-          </a:p>
-        </p:txBody>
-      </p:sp>
-      <p:sp>
-        <p:nvSpPr>
-          <p:cNvPr id="619" name="Google Shape;619;p32"/>
-          <p:cNvSpPr txBox="1">
-            <a:spLocks noGrp="1"/>
-          </p:cNvSpPr>
-          <p:nvPr>
-            <p:ph type="title" idx="15"/>
-          </p:nvPr>
-        </p:nvSpPr>
-        <p:spPr>
-          <a:xfrm>
-            <a:off x="337389" y="228855"/>
-            <a:ext cx="7912200" cy="606600"/>
-          </a:xfrm>
-          <a:prstGeom prst="rect">
-            <a:avLst/>
-          </a:prstGeom>
-        </p:spPr>
-        <p:txBody>
-          <a:bodyPr spcFirstLastPara="1" wrap="square" lIns="91425" tIns="91425" rIns="91425" bIns="91425" anchor="b" anchorCtr="0">
-            <a:noAutofit/>
-          </a:bodyPr>
-          <a:lstStyle/>
-          <a:p>
-            <a:pPr marL="0" lvl="0" indent="0" algn="ctr" rtl="0">
-              <a:spcBef>
-                <a:spcPts val="0"/>
-              </a:spcBef>
-              <a:spcAft>
-                <a:spcPts val="0"/>
-              </a:spcAft>
-              <a:buNone/>
-            </a:pPr>
-            <a:r>
-              <a:rPr lang="de-DE" dirty="0"/>
-              <a:t>Time </a:t>
-            </a:r>
-            <a:r>
-              <a:rPr lang="de-DE" dirty="0" err="1"/>
-              <a:t>Expense</a:t>
-            </a:r>
-            <a:endParaRPr dirty="0"/>
-          </a:p>
-        </p:txBody>
-      </p:sp>
-      <p:sp>
-        <p:nvSpPr>
-          <p:cNvPr id="629" name="Google Shape;629;p32"/>
-          <p:cNvSpPr/>
-          <p:nvPr/>
-        </p:nvSpPr>
-        <p:spPr>
-          <a:xfrm>
-            <a:off x="-8301" y="-5994"/>
-            <a:ext cx="1118700" cy="565500"/>
-          </a:xfrm>
-          <a:prstGeom prst="diamond">
-            <a:avLst/>
-          </a:prstGeom>
-          <a:noFill/>
-          <a:ln w="28575" cap="flat" cmpd="sng">
-            <a:solidFill>
-              <a:schemeClr val="accent2"/>
-            </a:solidFill>
-            <a:prstDash val="solid"/>
-            <a:round/>
-            <a:headEnd type="none" w="sm" len="sm"/>
-            <a:tailEnd type="none" w="sm" len="sm"/>
-          </a:ln>
-        </p:spPr>
-        <p:txBody>
-          <a:bodyPr spcFirstLastPara="1" wrap="square" lIns="91425" tIns="91425" rIns="91425" bIns="91425" anchor="ctr" anchorCtr="0">
-            <a:noAutofit/>
-          </a:bodyPr>
-          <a:lstStyle/>
-          <a:p>
-            <a:pPr marL="0" lvl="0" indent="0" algn="l" rtl="0">
-              <a:spcBef>
-                <a:spcPts val="0"/>
-              </a:spcBef>
-              <a:spcAft>
-                <a:spcPts val="0"/>
-              </a:spcAft>
-              <a:buNone/>
-            </a:pPr>
-            <a:endParaRPr dirty="0"/>
-          </a:p>
-        </p:txBody>
-      </p:sp>
-      <p:sp>
-        <p:nvSpPr>
-          <p:cNvPr id="630" name="Google Shape;630;p32"/>
-          <p:cNvSpPr/>
-          <p:nvPr/>
-        </p:nvSpPr>
-        <p:spPr>
-          <a:xfrm>
-            <a:off x="559349" y="-288744"/>
-            <a:ext cx="1118700" cy="565500"/>
-          </a:xfrm>
-          <a:prstGeom prst="diamond">
-            <a:avLst/>
-          </a:prstGeom>
-          <a:solidFill>
-            <a:schemeClr val="accent3"/>
-          </a:solidFill>
-          <a:ln>
-            <a:noFill/>
-          </a:ln>
-        </p:spPr>
-        <p:txBody>
-          <a:bodyPr spcFirstLastPara="1" wrap="square" lIns="91425" tIns="91425" rIns="91425" bIns="91425" anchor="ctr" anchorCtr="0">
-            <a:noAutofit/>
-          </a:bodyPr>
-          <a:lstStyle/>
-          <a:p>
-            <a:pPr marL="0" lvl="0" indent="0" algn="l" rtl="0">
-              <a:spcBef>
-                <a:spcPts val="0"/>
-              </a:spcBef>
-              <a:spcAft>
-                <a:spcPts val="0"/>
-              </a:spcAft>
-              <a:buNone/>
-            </a:pPr>
-            <a:endParaRPr dirty="0"/>
-          </a:p>
-        </p:txBody>
-      </p:sp>
-      <p:sp>
-        <p:nvSpPr>
-          <p:cNvPr id="631" name="Google Shape;631;p32"/>
-          <p:cNvSpPr/>
-          <p:nvPr/>
-        </p:nvSpPr>
-        <p:spPr>
-          <a:xfrm rot="5400000">
-            <a:off x="7622925" y="-188962"/>
-            <a:ext cx="1982400" cy="1106700"/>
-          </a:xfrm>
-          <a:prstGeom prst="hexagon">
-            <a:avLst>
-              <a:gd name="adj" fmla="val 25000"/>
-              <a:gd name="vf" fmla="val 115470"/>
-            </a:avLst>
-          </a:prstGeom>
-          <a:noFill/>
-          <a:ln w="28575" cap="flat" cmpd="sng">
-            <a:solidFill>
-              <a:schemeClr val="accent2"/>
-            </a:solidFill>
-            <a:prstDash val="solid"/>
-            <a:round/>
-            <a:headEnd type="none" w="sm" len="sm"/>
-            <a:tailEnd type="none" w="sm" len="sm"/>
-          </a:ln>
-        </p:spPr>
-        <p:txBody>
-          <a:bodyPr spcFirstLastPara="1" wrap="square" lIns="91425" tIns="91425" rIns="91425" bIns="91425" anchor="ctr" anchorCtr="0">
-            <a:noAutofit/>
-          </a:bodyPr>
-          <a:lstStyle/>
-          <a:p>
-            <a:pPr marL="0" lvl="0" indent="0" algn="l" rtl="0">
-              <a:spcBef>
-                <a:spcPts val="0"/>
-              </a:spcBef>
-              <a:spcAft>
-                <a:spcPts val="0"/>
-              </a:spcAft>
-              <a:buNone/>
-            </a:pPr>
-            <a:endParaRPr dirty="0"/>
-          </a:p>
-        </p:txBody>
-      </p:sp>
-      <p:sp>
-        <p:nvSpPr>
-          <p:cNvPr id="633" name="Google Shape;633;p32"/>
-          <p:cNvSpPr/>
-          <p:nvPr/>
-        </p:nvSpPr>
-        <p:spPr>
-          <a:xfrm>
-            <a:off x="8054775" y="1404426"/>
-            <a:ext cx="1118700" cy="565500"/>
-          </a:xfrm>
-          <a:prstGeom prst="diamond">
-            <a:avLst/>
-          </a:prstGeom>
-          <a:noFill/>
-          <a:ln w="28575" cap="flat" cmpd="sng">
-            <a:solidFill>
-              <a:schemeClr val="accent3"/>
-            </a:solidFill>
-            <a:prstDash val="solid"/>
-            <a:round/>
-            <a:headEnd type="none" w="sm" len="sm"/>
-            <a:tailEnd type="none" w="sm" len="sm"/>
-          </a:ln>
-        </p:spPr>
-        <p:txBody>
-          <a:bodyPr spcFirstLastPara="1" wrap="square" lIns="91425" tIns="91425" rIns="91425" bIns="91425" anchor="ctr" anchorCtr="0">
-            <a:noAutofit/>
-          </a:bodyPr>
-          <a:lstStyle/>
-          <a:p>
-            <a:pPr marL="0" lvl="0" indent="0" algn="l" rtl="0">
-              <a:spcBef>
-                <a:spcPts val="0"/>
-              </a:spcBef>
-              <a:spcAft>
-                <a:spcPts val="0"/>
-              </a:spcAft>
-              <a:buNone/>
-            </a:pPr>
-            <a:endParaRPr dirty="0"/>
-          </a:p>
-        </p:txBody>
-      </p:sp>
-      <p:pic>
-        <p:nvPicPr>
-          <p:cNvPr id="7" name="Grafik 6" descr="Münzen Silhouette">
-            <a:extLst>
-              <a:ext uri="{FF2B5EF4-FFF2-40B4-BE49-F238E27FC236}">
-                <a16:creationId xmlns:a16="http://schemas.microsoft.com/office/drawing/2014/main" id="{E356291B-8A1F-428F-8275-D658AC6F5FAC}"/>
-              </a:ext>
-            </a:extLst>
-          </p:cNvPr>
-          <p:cNvPicPr>
-            <a:picLocks noChangeAspect="1"/>
-          </p:cNvPicPr>
-          <p:nvPr/>
-        </p:nvPicPr>
-        <p:blipFill>
-          <a:blip r:embed="rId3">
-            <a:extLst>
-              <a:ext uri="{96DAC541-7B7A-43D3-8B79-37D633B846F1}">
-                <asvg:svgBlip xmlns:asvg="http://schemas.microsoft.com/office/drawing/2016/SVG/main" r:embed="rId4"/>
-              </a:ext>
-            </a:extLst>
-          </a:blip>
-          <a:stretch>
-            <a:fillRect/>
-          </a:stretch>
-        </p:blipFill>
-        <p:spPr>
-          <a:xfrm>
-            <a:off x="6448336" y="835455"/>
-            <a:ext cx="914400" cy="914400"/>
-          </a:xfrm>
-          <a:prstGeom prst="rect">
-            <a:avLst/>
-          </a:prstGeom>
-        </p:spPr>
-      </p:pic>
-      <p:pic>
-        <p:nvPicPr>
-          <p:cNvPr id="3" name="Grafik 2">
-            <a:extLst>
-              <a:ext uri="{FF2B5EF4-FFF2-40B4-BE49-F238E27FC236}">
-                <a16:creationId xmlns:a16="http://schemas.microsoft.com/office/drawing/2014/main" id="{9CAFBD88-1856-4D30-B130-E00C4304B66A}"/>
-              </a:ext>
-            </a:extLst>
-          </p:cNvPr>
-          <p:cNvPicPr>
-            <a:picLocks noChangeAspect="1"/>
-          </p:cNvPicPr>
-          <p:nvPr/>
-        </p:nvPicPr>
-        <p:blipFill rotWithShape="1">
-          <a:blip r:embed="rId5"/>
-          <a:srcRect l="26102" t="40979" r="27204" b="26629"/>
-          <a:stretch/>
-        </p:blipFill>
-        <p:spPr>
-          <a:xfrm>
-            <a:off x="1191937" y="1687176"/>
-            <a:ext cx="6203104" cy="2420450"/>
-          </a:xfrm>
-          <a:prstGeom prst="rect">
-            <a:avLst/>
-          </a:prstGeom>
-          <a:ln>
-            <a:noFill/>
-          </a:ln>
-          <a:effectLst>
-            <a:outerShdw blurRad="292100" dist="139700" dir="2700000" algn="tl" rotWithShape="0">
-              <a:srgbClr val="333333">
-                <a:alpha val="65000"/>
-              </a:srgbClr>
-            </a:outerShdw>
-          </a:effectLst>
-        </p:spPr>
-      </p:pic>
-      <p:pic>
-        <p:nvPicPr>
-          <p:cNvPr id="12" name="Grafik 11">
-            <a:extLst>
-              <a:ext uri="{FF2B5EF4-FFF2-40B4-BE49-F238E27FC236}">
-                <a16:creationId xmlns:a16="http://schemas.microsoft.com/office/drawing/2014/main" id="{22914723-15EE-4D3F-8A71-45C101724AF9}"/>
-              </a:ext>
-            </a:extLst>
-          </p:cNvPr>
-          <p:cNvPicPr>
-            <a:picLocks noChangeAspect="1"/>
-          </p:cNvPicPr>
-          <p:nvPr/>
-        </p:nvPicPr>
-        <p:blipFill rotWithShape="1">
-          <a:blip r:embed="rId6"/>
-          <a:srcRect l="26017" t="59058" r="27118" b="36874"/>
-          <a:stretch/>
-        </p:blipFill>
-        <p:spPr>
-          <a:xfrm>
-            <a:off x="779868" y="4616245"/>
-            <a:ext cx="7027241" cy="343102"/>
-          </a:xfrm>
-          <a:prstGeom prst="rect">
-            <a:avLst/>
-          </a:prstGeom>
-          <a:ln>
-            <a:noFill/>
-          </a:ln>
-          <a:effectLst>
-            <a:outerShdw blurRad="292100" dist="139700" dir="2700000" algn="tl" rotWithShape="0">
-              <a:srgbClr val="333333">
-                <a:alpha val="65000"/>
-              </a:srgbClr>
-            </a:outerShdw>
-          </a:effectLst>
-        </p:spPr>
-      </p:pic>
-      <p:sp>
-        <p:nvSpPr>
-          <p:cNvPr id="4" name="Pfeil: nach unten 3">
-            <a:extLst>
-              <a:ext uri="{FF2B5EF4-FFF2-40B4-BE49-F238E27FC236}">
-                <a16:creationId xmlns:a16="http://schemas.microsoft.com/office/drawing/2014/main" id="{D55FB2AA-AD06-4D88-9D9B-6C7223B15C1C}"/>
-              </a:ext>
-            </a:extLst>
-          </p:cNvPr>
-          <p:cNvSpPr/>
-          <p:nvPr/>
-        </p:nvSpPr>
-        <p:spPr>
-          <a:xfrm>
-            <a:off x="3785918" y="4152996"/>
-            <a:ext cx="1015139" cy="417879"/>
-          </a:xfrm>
-          <a:prstGeom prst="downArrow">
-            <a:avLst/>
-          </a:prstGeom>
-          <a:ln>
-            <a:noFill/>
-          </a:ln>
-        </p:spPr>
-        <p:style>
-          <a:lnRef idx="2">
-            <a:schemeClr val="accent1">
-              <a:shade val="50000"/>
-            </a:schemeClr>
-          </a:lnRef>
-          <a:fillRef idx="1">
-            <a:schemeClr val="accent1"/>
-          </a:fillRef>
-          <a:effectRef idx="0">
-            <a:schemeClr val="accent1"/>
-          </a:effectRef>
-          <a:fontRef idx="minor">
-            <a:schemeClr val="lt1"/>
-          </a:fontRef>
-        </p:style>
-        <p:txBody>
-          <a:bodyPr rtlCol="0" anchor="ctr"/>
-          <a:lstStyle/>
-          <a:p>
-            <a:pPr algn="ctr"/>
-            <a:endParaRPr lang="de-DE"/>
-          </a:p>
-        </p:txBody>
-      </p:sp>
-    </p:spTree>
-    <p:extLst>
-      <p:ext uri="{BB962C8B-B14F-4D97-AF65-F5344CB8AC3E}">
-        <p14:creationId xmlns:p14="http://schemas.microsoft.com/office/powerpoint/2010/main" val="2924829807"/>
       </p:ext>
     </p:extLst>
   </p:cSld>

</xml_diff>

<commit_message>
wednesday ppt commit 3 30.3
</commit_message>
<xml_diff>
--- a/University/wednesday_30_03/PPT wednesday.pptx
+++ b/University/wednesday_30_03/PPT wednesday.pptx
@@ -28372,10 +28372,10 @@
       </p:grpSpPr>
       <p:graphicFrame>
         <p:nvGraphicFramePr>
-          <p:cNvPr id="2" name="Objekt 1">
+          <p:cNvPr id="3" name="Objekt 2">
             <a:extLst>
               <a:ext uri="{FF2B5EF4-FFF2-40B4-BE49-F238E27FC236}">
-                <a16:creationId xmlns:a16="http://schemas.microsoft.com/office/drawing/2014/main" id="{A090E149-FEBE-4C18-8920-16F4C2ACEE64}"/>
+                <a16:creationId xmlns:a16="http://schemas.microsoft.com/office/drawing/2014/main" id="{227C141D-767C-46E9-A2A8-FA926860520D}"/>
               </a:ext>
             </a:extLst>
           </p:cNvPr>
@@ -28385,20 +28385,20 @@
           <p:nvPr>
             <p:extLst>
               <p:ext uri="{D42A27DB-BD31-4B8C-83A1-F6EECF244321}">
-                <p14:modId xmlns:p14="http://schemas.microsoft.com/office/powerpoint/2010/main" val="1661819869"/>
+                <p14:modId xmlns:p14="http://schemas.microsoft.com/office/powerpoint/2010/main" val="321803898"/>
               </p:ext>
             </p:extLst>
           </p:nvPr>
         </p:nvGraphicFramePr>
         <p:xfrm>
-          <a:off x="2099026" y="1"/>
-          <a:ext cx="4332772" cy="5246876"/>
+          <a:off x="2075993" y="-6371"/>
+          <a:ext cx="4185322" cy="5068318"/>
         </p:xfrm>
         <a:graphic>
           <a:graphicData uri="http://schemas.openxmlformats.org/presentationml/2006/ole">
             <mc:AlternateContent xmlns:mc="http://schemas.openxmlformats.org/markup-compatibility/2006">
               <mc:Choice xmlns:v="urn:schemas-microsoft-com:vml" Requires="v">
-                <p:oleObj spid="_x0000_s1027" name="Acrobat Document" r:id="rId4" imgW="5295826" imgH="6415758" progId="AcroExch.Document.DC">
+                <p:oleObj spid="_x0000_s1029" name="Acrobat Document" r:id="rId4" imgW="5295826" imgH="6415758" progId="AcroExch.Document.DC">
                   <p:embed/>
                 </p:oleObj>
               </mc:Choice>
@@ -28419,8 +28419,8 @@
                     </p:blipFill>
                     <p:spPr>
                       <a:xfrm>
-                        <a:off x="2099026" y="1"/>
-                        <a:ext cx="4332772" cy="5246876"/>
+                        <a:off x="2075993" y="-6371"/>
+                        <a:ext cx="4185322" cy="5068318"/>
                       </a:xfrm>
                       <a:prstGeom prst="rect">
                         <a:avLst/>

</xml_diff>